<commit_message>
Comentarios en archivo unidad III (organizacion)
</commit_message>
<xml_diff>
--- a/unidad III (organizacion).pptx
+++ b/unidad III (organizacion).pptx
@@ -121,6 +121,22 @@
       </a:defRPr>
     </a:lvl9pPr>
   </p:defaultTextStyle>
+  <p:extLst>
+    <p:ext uri="{EFAFB233-063F-42B5-8137-9DF3F51BA10A}">
+      <p15:sldGuideLst xmlns:p15="http://schemas.microsoft.com/office/powerpoint/2012/main">
+        <p15:guide id="1" orient="horz" pos="2160">
+          <p15:clr>
+            <a:srgbClr val="A4A3A4"/>
+          </p15:clr>
+        </p15:guide>
+        <p15:guide id="2" pos="2880">
+          <p15:clr>
+            <a:srgbClr val="A4A3A4"/>
+          </p15:clr>
+        </p15:guide>
+      </p15:sldGuideLst>
+    </p:ext>
+  </p:extLst>
 </p:presentation>
 </file>
 
@@ -4577,6 +4593,13 @@
   <p:clrMapOvr>
     <a:masterClrMapping/>
   </p:clrMapOvr>
+  <p:timing>
+    <p:tnLst>
+      <p:par>
+        <p:cTn id="1" dur="indefinite" restart="never" nodeType="tmRoot"/>
+      </p:par>
+    </p:tnLst>
+  </p:timing>
 </p:sld>
 </file>
 
@@ -4787,6 +4810,13 @@
   <p:clrMapOvr>
     <a:masterClrMapping/>
   </p:clrMapOvr>
+  <p:timing>
+    <p:tnLst>
+      <p:par>
+        <p:cTn id="1" dur="indefinite" restart="never" nodeType="tmRoot"/>
+      </p:par>
+    </p:tnLst>
+  </p:timing>
 </p:sld>
 </file>
 
@@ -5028,6 +5058,13 @@
   <p:clrMapOvr>
     <a:masterClrMapping/>
   </p:clrMapOvr>
+  <p:timing>
+    <p:tnLst>
+      <p:par>
+        <p:cTn id="1" dur="indefinite" restart="never" nodeType="tmRoot"/>
+      </p:par>
+    </p:tnLst>
+  </p:timing>
 </p:sld>
 </file>
 
@@ -5277,6 +5314,13 @@
   <p:clrMapOvr>
     <a:masterClrMapping/>
   </p:clrMapOvr>
+  <p:timing>
+    <p:tnLst>
+      <p:par>
+        <p:cTn id="1" dur="indefinite" restart="never" nodeType="tmRoot"/>
+      </p:par>
+    </p:tnLst>
+  </p:timing>
 </p:sld>
 </file>
 
@@ -5426,6 +5470,13 @@
   <p:clrMapOvr>
     <a:masterClrMapping/>
   </p:clrMapOvr>
+  <p:timing>
+    <p:tnLst>
+      <p:par>
+        <p:cTn id="1" dur="indefinite" restart="never" nodeType="tmRoot"/>
+      </p:par>
+    </p:tnLst>
+  </p:timing>
 </p:sld>
 </file>
 
@@ -5607,6 +5658,13 @@
   <p:clrMapOvr>
     <a:masterClrMapping/>
   </p:clrMapOvr>
+  <p:timing>
+    <p:tnLst>
+      <p:par>
+        <p:cTn id="1" dur="indefinite" restart="never" nodeType="tmRoot"/>
+      </p:par>
+    </p:tnLst>
+  </p:timing>
 </p:sld>
 </file>
 
@@ -5793,6 +5851,13 @@
   <p:clrMapOvr>
     <a:masterClrMapping/>
   </p:clrMapOvr>
+  <p:timing>
+    <p:tnLst>
+      <p:par>
+        <p:cTn id="1" dur="indefinite" restart="never" nodeType="tmRoot"/>
+      </p:par>
+    </p:tnLst>
+  </p:timing>
 </p:sld>
 </file>
 
@@ -5993,6 +6058,13 @@
   <p:clrMapOvr>
     <a:masterClrMapping/>
   </p:clrMapOvr>
+  <p:timing>
+    <p:tnLst>
+      <p:par>
+        <p:cTn id="1" dur="indefinite" restart="never" nodeType="tmRoot"/>
+      </p:par>
+    </p:tnLst>
+  </p:timing>
 </p:sld>
 </file>
 
@@ -6218,6 +6290,13 @@
   <p:clrMapOvr>
     <a:masterClrMapping/>
   </p:clrMapOvr>
+  <p:timing>
+    <p:tnLst>
+      <p:par>
+        <p:cTn id="1" dur="indefinite" restart="never" nodeType="tmRoot"/>
+      </p:par>
+    </p:tnLst>
+  </p:timing>
 </p:sld>
 </file>
 
@@ -6461,16 +6540,39 @@
                   <a:schemeClr val="tx1"/>
                 </a:solidFill>
               </a:rPr>
-              <a:t>es la mejor presentación, creo que ustedes se sacaron un diez. mis respetos compañeros no doy mi nombre por temor a represalias</a:t>
-            </a:r>
-            <a:r>
-              <a:rPr lang="es-MX" smtClean="0">
+              <a:t>es la mejor presentación, creo que ustedes se sacaron un diez. mis respetos compañeros no doy mi nombre por temor a represalias, saludos</a:t>
+            </a:r>
+            <a:r>
+              <a:rPr lang="es-MX" dirty="0" smtClean="0">
                 <a:solidFill>
                   <a:schemeClr val="tx1"/>
                 </a:solidFill>
               </a:rPr>
-              <a:t>, saludos!!</a:t>
-            </a:r>
+              <a:t>!!</a:t>
+            </a:r>
+          </a:p>
+          <a:p>
+            <a:r>
+              <a:rPr lang="es-MX" dirty="0" smtClean="0">
+                <a:solidFill>
+                  <a:srgbClr val="FF0000"/>
+                </a:solidFill>
+              </a:rPr>
+              <a:t>Javier Lizárraga:</a:t>
+            </a:r>
+            <a:r>
+              <a:rPr lang="es-MX" dirty="0" smtClean="0">
+                <a:solidFill>
+                  <a:schemeClr val="tx1"/>
+                </a:solidFill>
+              </a:rPr>
+              <a:t> Muy buena presentación.</a:t>
+            </a:r>
+            <a:endParaRPr lang="es-MX" dirty="0" smtClean="0">
+              <a:solidFill>
+                <a:schemeClr val="tx1"/>
+              </a:solidFill>
+            </a:endParaRPr>
           </a:p>
           <a:p>
             <a:endParaRPr lang="es-MX" dirty="0" smtClean="0">
@@ -6594,6 +6696,13 @@
   <p:clrMapOvr>
     <a:masterClrMapping/>
   </p:clrMapOvr>
+  <p:timing>
+    <p:tnLst>
+      <p:par>
+        <p:cTn id="1" dur="indefinite" restart="never" nodeType="tmRoot"/>
+      </p:par>
+    </p:tnLst>
+  </p:timing>
 </p:sld>
 </file>
 
@@ -6802,6 +6911,13 @@
   <p:clrMapOvr>
     <a:masterClrMapping/>
   </p:clrMapOvr>
+  <p:timing>
+    <p:tnLst>
+      <p:par>
+        <p:cTn id="1" dur="indefinite" restart="never" nodeType="tmRoot"/>
+      </p:par>
+    </p:tnLst>
+  </p:timing>
 </p:sld>
 </file>
 
@@ -7119,6 +7235,13 @@
   <p:clrMapOvr>
     <a:masterClrMapping/>
   </p:clrMapOvr>
+  <p:timing>
+    <p:tnLst>
+      <p:par>
+        <p:cTn id="1" dur="indefinite" restart="never" nodeType="tmRoot"/>
+      </p:par>
+    </p:tnLst>
+  </p:timing>
 </p:sld>
 </file>
 
@@ -7324,6 +7447,13 @@
   <p:clrMapOvr>
     <a:masterClrMapping/>
   </p:clrMapOvr>
+  <p:timing>
+    <p:tnLst>
+      <p:par>
+        <p:cTn id="1" dur="indefinite" restart="never" nodeType="tmRoot"/>
+      </p:par>
+    </p:tnLst>
+  </p:timing>
 </p:sld>
 </file>
 
@@ -7562,6 +7692,13 @@
   <p:clrMapOvr>
     <a:masterClrMapping/>
   </p:clrMapOvr>
+  <p:timing>
+    <p:tnLst>
+      <p:par>
+        <p:cTn id="1" dur="indefinite" restart="never" nodeType="tmRoot"/>
+      </p:par>
+    </p:tnLst>
+  </p:timing>
 </p:sld>
 </file>
 
@@ -7811,6 +7948,13 @@
   <p:clrMapOvr>
     <a:masterClrMapping/>
   </p:clrMapOvr>
+  <p:timing>
+    <p:tnLst>
+      <p:par>
+        <p:cTn id="1" dur="indefinite" restart="never" nodeType="tmRoot"/>
+      </p:par>
+    </p:tnLst>
+  </p:timing>
 </p:sld>
 </file>
 
@@ -7960,6 +8104,13 @@
   <p:clrMapOvr>
     <a:masterClrMapping/>
   </p:clrMapOvr>
+  <p:timing>
+    <p:tnLst>
+      <p:par>
+        <p:cTn id="1" dur="indefinite" restart="never" nodeType="tmRoot"/>
+      </p:par>
+    </p:tnLst>
+  </p:timing>
 </p:sld>
 </file>
 
@@ -8126,6 +8277,13 @@
   <p:clrMapOvr>
     <a:masterClrMapping/>
   </p:clrMapOvr>
+  <p:timing>
+    <p:tnLst>
+      <p:par>
+        <p:cTn id="1" dur="indefinite" restart="never" nodeType="tmRoot"/>
+      </p:par>
+    </p:tnLst>
+  </p:timing>
 </p:sld>
 </file>
 
@@ -8303,6 +8461,13 @@
   <p:clrMapOvr>
     <a:masterClrMapping/>
   </p:clrMapOvr>
+  <p:timing>
+    <p:tnLst>
+      <p:par>
+        <p:cTn id="1" dur="indefinite" restart="never" nodeType="tmRoot"/>
+      </p:par>
+    </p:tnLst>
+  </p:timing>
 </p:sld>
 </file>
 

</xml_diff>